<commit_message>
Added: - Last Commit with fixes.
</commit_message>
<xml_diff>
--- a/presentation/MoSD_Exam_Presentation.pptx
+++ b/presentation/MoSD_Exam_Presentation.pptx
@@ -847,7 +847,114 @@
           <a:bodyPr/>
           <a:lstStyle/>
           <a:p>
-            <a:endParaRPr lang="en-US"/>
+            <a:r>
+              <a:rPr lang="en-US" dirty="0" err="1"/>
+              <a:t>Bewertet</a:t>
+            </a:r>
+            <a:r>
+              <a:rPr lang="en-US" dirty="0"/>
+              <a:t> </a:t>
+            </a:r>
+            <a:r>
+              <a:rPr lang="en-US" dirty="0" err="1"/>
+              <a:t>Metadaten-Mängel</a:t>
+            </a:r>
+            <a:r>
+              <a:rPr lang="en-US" dirty="0"/>
+              <a:t> auf Website/GitHub, um Describe-Schritt </a:t>
+            </a:r>
+            <a:r>
+              <a:rPr lang="en-US" dirty="0" err="1"/>
+              <a:t>zu</a:t>
+            </a:r>
+            <a:r>
+              <a:rPr lang="en-US" dirty="0"/>
+              <a:t> </a:t>
+            </a:r>
+            <a:r>
+              <a:rPr lang="en-US" dirty="0" err="1"/>
+              <a:t>illustrieren</a:t>
+            </a:r>
+            <a:r>
+              <a:rPr lang="en-US" dirty="0"/>
+              <a:t>. </a:t>
+            </a:r>
+          </a:p>
+          <a:p>
+            <a:r>
+              <a:rPr lang="en-US" dirty="0" err="1"/>
+              <a:t>Empfiehlt</a:t>
+            </a:r>
+            <a:r>
+              <a:rPr lang="en-US" dirty="0"/>
+              <a:t> README/</a:t>
+            </a:r>
+            <a:r>
+              <a:rPr lang="en-US" dirty="0" err="1"/>
+              <a:t>Dokumentation</a:t>
+            </a:r>
+            <a:r>
+              <a:rPr lang="en-US" dirty="0"/>
+              <a:t>, um </a:t>
+            </a:r>
+            <a:r>
+              <a:rPr lang="en-US" dirty="0" err="1"/>
+              <a:t>Metadaten</a:t>
+            </a:r>
+            <a:r>
+              <a:rPr lang="en-US" dirty="0"/>
+              <a:t> </a:t>
+            </a:r>
+            <a:r>
+              <a:rPr lang="en-US" dirty="0" err="1"/>
+              <a:t>zu</a:t>
+            </a:r>
+            <a:r>
+              <a:rPr lang="en-US" dirty="0"/>
+              <a:t> </a:t>
+            </a:r>
+            <a:r>
+              <a:rPr lang="en-US" dirty="0" err="1"/>
+              <a:t>verbessern</a:t>
+            </a:r>
+            <a:r>
+              <a:rPr lang="en-US" dirty="0"/>
+              <a:t> (FAIR: Findable). </a:t>
+            </a:r>
+          </a:p>
+          <a:p>
+            <a:r>
+              <a:rPr lang="en-US" dirty="0" err="1"/>
+              <a:t>Betont</a:t>
+            </a:r>
+            <a:r>
+              <a:rPr lang="en-US" dirty="0"/>
+              <a:t> </a:t>
+            </a:r>
+            <a:r>
+              <a:rPr lang="en-US" dirty="0" err="1"/>
+              <a:t>Selbsterklärendheit</a:t>
+            </a:r>
+            <a:r>
+              <a:rPr lang="en-US" dirty="0"/>
+              <a:t>, um Usability in Re-use </a:t>
+            </a:r>
+            <a:r>
+              <a:rPr lang="en-US" dirty="0" err="1"/>
+              <a:t>zu</a:t>
+            </a:r>
+            <a:r>
+              <a:rPr lang="en-US" dirty="0"/>
+              <a:t> </a:t>
+            </a:r>
+            <a:r>
+              <a:rPr lang="en-US" dirty="0" err="1"/>
+              <a:t>zeigen</a:t>
+            </a:r>
+            <a:r>
+              <a:rPr lang="en-US" dirty="0"/>
+              <a:t>.</a:t>
+            </a:r>
           </a:p>
         </p:txBody>
       </p:sp>
@@ -955,7 +1062,118 @@
           <a:bodyPr/>
           <a:lstStyle/>
           <a:p>
-            <a:endParaRPr lang="en-US"/>
+            <a:r>
+              <a:rPr lang="en-US" dirty="0" err="1"/>
+              <a:t>Redundante</a:t>
+            </a:r>
+            <a:r>
+              <a:rPr lang="en-US" dirty="0"/>
+              <a:t> </a:t>
+            </a:r>
+            <a:r>
+              <a:rPr lang="en-US" dirty="0" err="1"/>
+              <a:t>Speicherung</a:t>
+            </a:r>
+            <a:r>
+              <a:rPr lang="en-US" dirty="0"/>
+              <a:t> (Website/GitHub), um Preservation </a:t>
+            </a:r>
+            <a:r>
+              <a:rPr lang="en-US" dirty="0" err="1"/>
+              <a:t>zu</a:t>
+            </a:r>
+            <a:r>
+              <a:rPr lang="en-US" dirty="0"/>
+              <a:t> </a:t>
+            </a:r>
+            <a:r>
+              <a:rPr lang="en-US" dirty="0" err="1"/>
+              <a:t>demonstrieren</a:t>
+            </a:r>
+            <a:r>
+              <a:rPr lang="en-US" dirty="0"/>
+              <a:t>. </a:t>
+            </a:r>
+          </a:p>
+          <a:p>
+            <a:r>
+              <a:rPr lang="en-US" dirty="0"/>
+              <a:t>Zenodo-Empfehlung für DOI, um </a:t>
+            </a:r>
+            <a:r>
+              <a:rPr lang="en-US" dirty="0" err="1"/>
+              <a:t>Persistenz</a:t>
+            </a:r>
+            <a:r>
+              <a:rPr lang="en-US" dirty="0"/>
+              <a:t> </a:t>
+            </a:r>
+            <a:r>
+              <a:rPr lang="en-US" dirty="0" err="1"/>
+              <a:t>zu</a:t>
+            </a:r>
+            <a:r>
+              <a:rPr lang="en-US" dirty="0"/>
+              <a:t> </a:t>
+            </a:r>
+            <a:r>
+              <a:rPr lang="en-US" dirty="0" err="1"/>
+              <a:t>sichern</a:t>
+            </a:r>
+            <a:r>
+              <a:rPr lang="en-US" dirty="0"/>
+              <a:t>. </a:t>
+            </a:r>
+          </a:p>
+          <a:p>
+            <a:r>
+              <a:rPr lang="en-US" dirty="0" err="1"/>
+              <a:t>Fehlende</a:t>
+            </a:r>
+            <a:r>
+              <a:rPr lang="en-US" dirty="0"/>
+              <a:t> Features (Artikel, Quality, </a:t>
+            </a:r>
+            <a:r>
+              <a:rPr lang="en-US" dirty="0" err="1"/>
+              <a:t>Autoren</a:t>
+            </a:r>
+            <a:r>
+              <a:rPr lang="en-US" dirty="0"/>
+              <a:t>), um </a:t>
+            </a:r>
+            <a:r>
+              <a:rPr lang="en-US" dirty="0" err="1"/>
+              <a:t>Lücken</a:t>
+            </a:r>
+            <a:r>
+              <a:rPr lang="en-US" dirty="0"/>
+              <a:t> in </a:t>
+            </a:r>
+            <a:r>
+              <a:rPr lang="en-US" dirty="0" err="1"/>
+              <a:t>MoSD</a:t>
+            </a:r>
+            <a:r>
+              <a:rPr lang="en-US" dirty="0"/>
+              <a:t> </a:t>
+            </a:r>
+            <a:r>
+              <a:rPr lang="en-US" dirty="0" err="1"/>
+              <a:t>zu</a:t>
+            </a:r>
+            <a:r>
+              <a:rPr lang="en-US" dirty="0"/>
+              <a:t> </a:t>
+            </a:r>
+            <a:r>
+              <a:rPr lang="en-US" dirty="0" err="1"/>
+              <a:t>diskutieren</a:t>
+            </a:r>
+            <a:r>
+              <a:rPr lang="en-US" dirty="0"/>
+              <a:t>.</a:t>
+            </a:r>
           </a:p>
         </p:txBody>
       </p:sp>
@@ -1063,7 +1281,76 @@
           <a:bodyPr/>
           <a:lstStyle/>
           <a:p>
-            <a:endParaRPr lang="en-US"/>
+            <a:r>
+              <a:rPr lang="en-US" dirty="0" err="1"/>
+              <a:t>Metadaten</a:t>
+            </a:r>
+            <a:r>
+              <a:rPr lang="en-US" dirty="0"/>
+              <a:t>/</a:t>
+            </a:r>
+            <a:r>
+              <a:rPr lang="en-US" dirty="0" err="1"/>
+              <a:t>Zugang</a:t>
+            </a:r>
+            <a:r>
+              <a:rPr lang="en-US" dirty="0"/>
+              <a:t>/</a:t>
+            </a:r>
+            <a:r>
+              <a:rPr lang="en-US" dirty="0" err="1"/>
+              <a:t>Lizenz</a:t>
+            </a:r>
+            <a:r>
+              <a:rPr lang="en-US" dirty="0"/>
+              <a:t>, um Accessible/Re-usable </a:t>
+            </a:r>
+            <a:r>
+              <a:rPr lang="en-US" dirty="0" err="1"/>
+              <a:t>zu</a:t>
+            </a:r>
+            <a:r>
+              <a:rPr lang="en-US" dirty="0"/>
+              <a:t> </a:t>
+            </a:r>
+            <a:r>
+              <a:rPr lang="en-US" dirty="0" err="1"/>
+              <a:t>machen</a:t>
+            </a:r>
+            <a:r>
+              <a:rPr lang="en-US" dirty="0"/>
+              <a:t>. </a:t>
+            </a:r>
+          </a:p>
+          <a:p>
+            <a:r>
+              <a:rPr lang="en-US" dirty="0"/>
+              <a:t>Archive/</a:t>
+            </a:r>
+            <a:r>
+              <a:rPr lang="en-US" dirty="0" err="1"/>
+              <a:t>Indexierung</a:t>
+            </a:r>
+            <a:r>
+              <a:rPr lang="en-US" dirty="0"/>
+              <a:t>, um Long-term Preservation </a:t>
+            </a:r>
+            <a:r>
+              <a:rPr lang="en-US" dirty="0" err="1"/>
+              <a:t>zu</a:t>
+            </a:r>
+            <a:r>
+              <a:rPr lang="en-US" dirty="0"/>
+              <a:t> </a:t>
+            </a:r>
+            <a:r>
+              <a:rPr lang="en-US" dirty="0" err="1"/>
+              <a:t>unterstützen</a:t>
+            </a:r>
+            <a:r>
+              <a:rPr lang="en-US" dirty="0"/>
+              <a:t>.</a:t>
+            </a:r>
           </a:p>
         </p:txBody>
       </p:sp>
@@ -1171,7 +1458,114 @@
           <a:bodyPr/>
           <a:lstStyle/>
           <a:p>
-            <a:endParaRPr lang="en-US"/>
+            <a:r>
+              <a:rPr lang="en-US" dirty="0" err="1"/>
+              <a:t>Sucht</a:t>
+            </a:r>
+            <a:r>
+              <a:rPr lang="en-US" dirty="0"/>
+              <a:t> </a:t>
+            </a:r>
+            <a:r>
+              <a:rPr lang="en-US" dirty="0" err="1"/>
+              <a:t>ähnliche</a:t>
+            </a:r>
+            <a:r>
+              <a:rPr lang="en-US" dirty="0"/>
+              <a:t> Datasets (</a:t>
+            </a:r>
+            <a:r>
+              <a:rPr lang="en-US" dirty="0" err="1"/>
+              <a:t>Zenodo</a:t>
+            </a:r>
+            <a:r>
+              <a:rPr lang="en-US" dirty="0"/>
+              <a:t>), um Discover in Lifecycle </a:t>
+            </a:r>
+            <a:r>
+              <a:rPr lang="en-US" dirty="0" err="1"/>
+              <a:t>zu</a:t>
+            </a:r>
+            <a:r>
+              <a:rPr lang="en-US" dirty="0"/>
+              <a:t> </a:t>
+            </a:r>
+            <a:r>
+              <a:rPr lang="en-US" dirty="0" err="1"/>
+              <a:t>zeigen</a:t>
+            </a:r>
+            <a:r>
+              <a:rPr lang="en-US" dirty="0"/>
+              <a:t>. </a:t>
+            </a:r>
+          </a:p>
+          <a:p>
+            <a:r>
+              <a:rPr lang="en-US" dirty="0" err="1"/>
+              <a:t>Regionale</a:t>
+            </a:r>
+            <a:r>
+              <a:rPr lang="en-US" dirty="0"/>
+              <a:t> </a:t>
+            </a:r>
+            <a:r>
+              <a:rPr lang="en-US" dirty="0" err="1"/>
+              <a:t>Einschränkungen</a:t>
+            </a:r>
+            <a:r>
+              <a:rPr lang="en-US" dirty="0"/>
+              <a:t>, um Data Search-Challenges </a:t>
+            </a:r>
+            <a:r>
+              <a:rPr lang="en-US" dirty="0" err="1"/>
+              <a:t>zu</a:t>
+            </a:r>
+            <a:r>
+              <a:rPr lang="en-US" dirty="0"/>
+              <a:t> </a:t>
+            </a:r>
+            <a:r>
+              <a:rPr lang="en-US" dirty="0" err="1"/>
+              <a:t>adressieren</a:t>
+            </a:r>
+            <a:r>
+              <a:rPr lang="en-US" dirty="0"/>
+              <a:t>. </a:t>
+            </a:r>
+          </a:p>
+          <a:p>
+            <a:r>
+              <a:rPr lang="en-US" dirty="0" err="1"/>
+              <a:t>ReproHack</a:t>
+            </a:r>
+            <a:r>
+              <a:rPr lang="en-US" dirty="0"/>
+              <a:t>-Integration, um Potential für </a:t>
+            </a:r>
+            <a:r>
+              <a:rPr lang="en-US" dirty="0" err="1"/>
+              <a:t>weitere</a:t>
+            </a:r>
+            <a:r>
+              <a:rPr lang="en-US" dirty="0"/>
+              <a:t> Re-use </a:t>
+            </a:r>
+            <a:r>
+              <a:rPr lang="en-US" dirty="0" err="1"/>
+              <a:t>zu</a:t>
+            </a:r>
+            <a:r>
+              <a:rPr lang="en-US" dirty="0"/>
+              <a:t> </a:t>
+            </a:r>
+            <a:r>
+              <a:rPr lang="en-US" dirty="0" err="1"/>
+              <a:t>erwähnen</a:t>
+            </a:r>
+            <a:r>
+              <a:rPr lang="en-US" dirty="0"/>
+              <a:t>.</a:t>
+            </a:r>
           </a:p>
         </p:txBody>
       </p:sp>
@@ -1279,7 +1673,76 @@
           <a:bodyPr/>
           <a:lstStyle/>
           <a:p>
-            <a:endParaRPr lang="en-US"/>
+            <a:r>
+              <a:rPr lang="en-US" dirty="0" err="1"/>
+              <a:t>Beschreibt</a:t>
+            </a:r>
+            <a:r>
+              <a:rPr lang="en-US" dirty="0"/>
+              <a:t> Preprocessing (Format-</a:t>
+            </a:r>
+            <a:r>
+              <a:rPr lang="en-US" dirty="0" err="1"/>
+              <a:t>Anpassung</a:t>
+            </a:r>
+            <a:r>
+              <a:rPr lang="en-US" dirty="0"/>
+              <a:t>, Merge, Removal, Export), um Integration </a:t>
+            </a:r>
+            <a:r>
+              <a:rPr lang="en-US" dirty="0" err="1"/>
+              <a:t>zu</a:t>
+            </a:r>
+            <a:r>
+              <a:rPr lang="en-US" dirty="0"/>
+              <a:t> </a:t>
+            </a:r>
+            <a:r>
+              <a:rPr lang="en-US" dirty="0" err="1"/>
+              <a:t>demonstrieren</a:t>
+            </a:r>
+            <a:r>
+              <a:rPr lang="en-US" dirty="0"/>
+              <a:t>. </a:t>
+            </a:r>
+          </a:p>
+          <a:p>
+            <a:r>
+              <a:rPr lang="en-US" dirty="0"/>
+              <a:t>AI-</a:t>
+            </a:r>
+            <a:r>
+              <a:rPr lang="en-US" dirty="0" err="1"/>
+              <a:t>Hilfe</a:t>
+            </a:r>
+            <a:r>
+              <a:rPr lang="en-US" dirty="0"/>
+              <a:t>, um Tools in </a:t>
+            </a:r>
+            <a:r>
+              <a:rPr lang="en-US" dirty="0" err="1"/>
+              <a:t>MoSD</a:t>
+            </a:r>
+            <a:r>
+              <a:rPr lang="en-US" dirty="0"/>
+              <a:t> </a:t>
+            </a:r>
+            <a:r>
+              <a:rPr lang="en-US" dirty="0" err="1"/>
+              <a:t>zu</a:t>
+            </a:r>
+            <a:r>
+              <a:rPr lang="en-US" dirty="0"/>
+              <a:t> </a:t>
+            </a:r>
+            <a:r>
+              <a:rPr lang="en-US" dirty="0" err="1"/>
+              <a:t>integrieren</a:t>
+            </a:r>
+            <a:r>
+              <a:rPr lang="en-US" dirty="0"/>
+              <a:t>.</a:t>
+            </a:r>
           </a:p>
         </p:txBody>
       </p:sp>
@@ -1387,7 +1850,64 @@
           <a:bodyPr/>
           <a:lstStyle/>
           <a:p>
-            <a:endParaRPr lang="en-US"/>
+            <a:r>
+              <a:rPr lang="en-US" dirty="0" err="1"/>
+              <a:t>Schritte</a:t>
+            </a:r>
+            <a:r>
+              <a:rPr lang="en-US" dirty="0"/>
+              <a:t> (Iteration, </a:t>
+            </a:r>
+            <a:r>
+              <a:rPr lang="en-US" dirty="0" err="1"/>
+              <a:t>Aufteilung</a:t>
+            </a:r>
+            <a:r>
+              <a:rPr lang="en-US" dirty="0"/>
+              <a:t>, Plots), um Analyze-Schritt </a:t>
+            </a:r>
+            <a:r>
+              <a:rPr lang="en-US" dirty="0" err="1"/>
+              <a:t>abzudecken</a:t>
+            </a:r>
+            <a:r>
+              <a:rPr lang="en-US" dirty="0"/>
+              <a:t>. </a:t>
+            </a:r>
+          </a:p>
+          <a:p>
+            <a:r>
+              <a:rPr lang="en-US" dirty="0" err="1"/>
+              <a:t>Prüft</a:t>
+            </a:r>
+            <a:r>
+              <a:rPr lang="en-US" dirty="0"/>
+              <a:t> </a:t>
+            </a:r>
+            <a:r>
+              <a:rPr lang="en-US" dirty="0" err="1"/>
+              <a:t>Abhängigkeit</a:t>
+            </a:r>
+            <a:r>
+              <a:rPr lang="en-US" dirty="0"/>
+              <a:t>, um RQ </a:t>
+            </a:r>
+            <a:r>
+              <a:rPr lang="en-US" dirty="0" err="1"/>
+              <a:t>zu</a:t>
+            </a:r>
+            <a:r>
+              <a:rPr lang="en-US" dirty="0"/>
+              <a:t> </a:t>
+            </a:r>
+            <a:r>
+              <a:rPr lang="en-US" dirty="0" err="1"/>
+              <a:t>beantworten</a:t>
+            </a:r>
+            <a:r>
+              <a:rPr lang="en-US" dirty="0"/>
+              <a:t>.</a:t>
+            </a:r>
           </a:p>
         </p:txBody>
       </p:sp>
@@ -1495,7 +2015,80 @@
           <a:bodyPr/>
           <a:lstStyle/>
           <a:p>
-            <a:endParaRPr lang="en-US"/>
+            <a:pPr marL="0" marR="0" lvl="0" indent="0" algn="l" defTabSz="914400" rtl="0" eaLnBrk="1" fontAlgn="auto" latinLnBrk="0" hangingPunct="1">
+              <a:lnSpc>
+                <a:spcPct val="100000"/>
+              </a:lnSpc>
+              <a:spcBef>
+                <a:spcPts val="0"/>
+              </a:spcBef>
+              <a:spcAft>
+                <a:spcPts val="0"/>
+              </a:spcAft>
+              <a:buClrTx/>
+              <a:buSzTx/>
+              <a:buFontTx/>
+              <a:buNone/>
+              <a:tabLst/>
+              <a:defRPr/>
+            </a:pPr>
+            <a:r>
+              <a:rPr lang="en-US" dirty="0">
+                <a:effectLst/>
+              </a:rPr>
+              <a:t>Plot-</a:t>
+            </a:r>
+            <a:r>
+              <a:rPr lang="en-US" dirty="0" err="1">
+                <a:effectLst/>
+              </a:rPr>
+              <a:t>Beispiel</a:t>
+            </a:r>
+            <a:r>
+              <a:rPr lang="en-US" dirty="0">
+                <a:effectLst/>
+              </a:rPr>
+              <a:t>, um </a:t>
+            </a:r>
+            <a:r>
+              <a:rPr lang="en-US" dirty="0" err="1">
+                <a:effectLst/>
+              </a:rPr>
+              <a:t>Visualisierung</a:t>
+            </a:r>
+            <a:r>
+              <a:rPr lang="en-US" dirty="0">
+                <a:effectLst/>
+              </a:rPr>
+              <a:t> in Analysis </a:t>
+            </a:r>
+            <a:r>
+              <a:rPr lang="en-US" dirty="0" err="1">
+                <a:effectLst/>
+              </a:rPr>
+              <a:t>zu</a:t>
+            </a:r>
+            <a:r>
+              <a:rPr lang="en-US" dirty="0">
+                <a:effectLst/>
+              </a:rPr>
+              <a:t> </a:t>
+            </a:r>
+            <a:r>
+              <a:rPr lang="en-US" dirty="0" err="1">
+                <a:effectLst/>
+              </a:rPr>
+              <a:t>zeigen</a:t>
+            </a:r>
+            <a:r>
+              <a:rPr lang="en-US" dirty="0">
+                <a:effectLst/>
+              </a:rPr>
+              <a:t>.</a:t>
+            </a:r>
+          </a:p>
+          <a:p>
+            <a:endParaRPr lang="en-US" dirty="0"/>
           </a:p>
         </p:txBody>
       </p:sp>
@@ -1603,7 +2196,76 @@
           <a:bodyPr/>
           <a:lstStyle/>
           <a:p>
-            <a:endParaRPr lang="en-US"/>
+            <a:r>
+              <a:rPr lang="en-US" dirty="0" err="1"/>
+              <a:t>Bewertet</a:t>
+            </a:r>
+            <a:r>
+              <a:rPr lang="en-US" dirty="0"/>
+              <a:t> FAIR-</a:t>
+            </a:r>
+            <a:r>
+              <a:rPr lang="en-US" dirty="0" err="1"/>
+              <a:t>Kriterien</a:t>
+            </a:r>
+            <a:r>
+              <a:rPr lang="en-US" dirty="0"/>
+              <a:t>, um Re-use/Preservation </a:t>
+            </a:r>
+            <a:r>
+              <a:rPr lang="en-US" dirty="0" err="1"/>
+              <a:t>zu</a:t>
+            </a:r>
+            <a:r>
+              <a:rPr lang="en-US" dirty="0"/>
+              <a:t> </a:t>
+            </a:r>
+            <a:r>
+              <a:rPr lang="en-US" dirty="0" err="1"/>
+              <a:t>evaluieren</a:t>
+            </a:r>
+            <a:r>
+              <a:rPr lang="en-US" dirty="0"/>
+              <a:t>. </a:t>
+            </a:r>
+          </a:p>
+          <a:p>
+            <a:r>
+              <a:rPr lang="en-US" dirty="0"/>
+              <a:t>63.33%-Score, um </a:t>
+            </a:r>
+            <a:r>
+              <a:rPr lang="en-US" dirty="0" err="1"/>
+              <a:t>Quantifizierung</a:t>
+            </a:r>
+            <a:r>
+              <a:rPr lang="en-US" dirty="0"/>
+              <a:t> in </a:t>
+            </a:r>
+            <a:r>
+              <a:rPr lang="en-US" dirty="0" err="1"/>
+              <a:t>MoSD</a:t>
+            </a:r>
+            <a:r>
+              <a:rPr lang="en-US" dirty="0"/>
+              <a:t> </a:t>
+            </a:r>
+            <a:r>
+              <a:rPr lang="en-US" dirty="0" err="1"/>
+              <a:t>zu</a:t>
+            </a:r>
+            <a:r>
+              <a:rPr lang="en-US" dirty="0"/>
+              <a:t> </a:t>
+            </a:r>
+            <a:r>
+              <a:rPr lang="en-US" dirty="0" err="1"/>
+              <a:t>demonstrieren</a:t>
+            </a:r>
+            <a:r>
+              <a:rPr lang="en-US" dirty="0"/>
+              <a:t>.</a:t>
+            </a:r>
           </a:p>
         </p:txBody>
       </p:sp>
@@ -1693,7 +2355,181 @@
           <a:bodyPr/>
           <a:lstStyle/>
           <a:p>
-            <a:endParaRPr lang="en-US"/>
+            <a:r>
+              <a:rPr lang="en-US" dirty="0" err="1"/>
+              <a:t>Wählt</a:t>
+            </a:r>
+            <a:r>
+              <a:rPr lang="en-US" dirty="0"/>
+              <a:t> COVID-Daten, um Collect-Schritt </a:t>
+            </a:r>
+            <a:r>
+              <a:rPr lang="en-US" dirty="0" err="1"/>
+              <a:t>zu</a:t>
+            </a:r>
+            <a:r>
+              <a:rPr lang="en-US" dirty="0"/>
+              <a:t> </a:t>
+            </a:r>
+            <a:r>
+              <a:rPr lang="en-US" dirty="0" err="1"/>
+              <a:t>illustrieren</a:t>
+            </a:r>
+            <a:r>
+              <a:rPr lang="en-US" dirty="0"/>
+              <a:t>: </a:t>
+            </a:r>
+            <a:r>
+              <a:rPr lang="en-US" dirty="0" err="1"/>
+              <a:t>Strukturierte</a:t>
+            </a:r>
+            <a:r>
+              <a:rPr lang="en-US" dirty="0"/>
+              <a:t>, quantitative Daten </a:t>
+            </a:r>
+            <a:r>
+              <a:rPr lang="en-US" dirty="0" err="1"/>
+              <a:t>aus</a:t>
+            </a:r>
+            <a:r>
+              <a:rPr lang="en-US" dirty="0"/>
+              <a:t> </a:t>
+            </a:r>
+            <a:r>
+              <a:rPr lang="en-US" dirty="0" err="1"/>
+              <a:t>offizieller</a:t>
+            </a:r>
+            <a:r>
+              <a:rPr lang="en-US" dirty="0"/>
+              <a:t> Quelle (ECDC). </a:t>
+            </a:r>
+          </a:p>
+          <a:p>
+            <a:endParaRPr lang="en-US" dirty="0"/>
+          </a:p>
+          <a:p>
+            <a:r>
+              <a:rPr lang="en-US" dirty="0" err="1"/>
+              <a:t>Beschreibt</a:t>
+            </a:r>
+            <a:r>
+              <a:rPr lang="en-US" dirty="0"/>
+              <a:t> </a:t>
+            </a:r>
+            <a:r>
+              <a:rPr lang="en-US" dirty="0" err="1"/>
+              <a:t>Datensatz-Größen</a:t>
+            </a:r>
+            <a:r>
+              <a:rPr lang="en-US" dirty="0"/>
+              <a:t>, um </a:t>
+            </a:r>
+            <a:r>
+              <a:rPr lang="en-US" dirty="0" err="1"/>
+              <a:t>Volumen</a:t>
+            </a:r>
+            <a:r>
+              <a:rPr lang="en-US" dirty="0"/>
+              <a:t> und Origin </a:t>
+            </a:r>
+            <a:r>
+              <a:rPr lang="en-US" dirty="0" err="1"/>
+              <a:t>zu</a:t>
+            </a:r>
+            <a:r>
+              <a:rPr lang="en-US" dirty="0"/>
+              <a:t> </a:t>
+            </a:r>
+            <a:r>
+              <a:rPr lang="en-US" dirty="0" err="1"/>
+              <a:t>dokumentieren</a:t>
+            </a:r>
+            <a:r>
+              <a:rPr lang="en-US" dirty="0"/>
+              <a:t> (Describe). </a:t>
+            </a:r>
+          </a:p>
+          <a:p>
+            <a:endParaRPr lang="en-US" dirty="0"/>
+          </a:p>
+          <a:p>
+            <a:r>
+              <a:rPr lang="en-US" dirty="0" err="1"/>
+              <a:t>Betont</a:t>
+            </a:r>
+            <a:r>
+              <a:rPr lang="en-US" dirty="0"/>
+              <a:t> </a:t>
+            </a:r>
+            <a:r>
+              <a:rPr lang="en-US" dirty="0" err="1"/>
+              <a:t>Relevanz</a:t>
+            </a:r>
+            <a:r>
+              <a:rPr lang="en-US" dirty="0"/>
+              <a:t> und </a:t>
+            </a:r>
+            <a:r>
+              <a:rPr lang="en-US" dirty="0" err="1"/>
+              <a:t>Aktualität</a:t>
+            </a:r>
+            <a:r>
+              <a:rPr lang="en-US" dirty="0"/>
+              <a:t>, um Timeliness in Assure </a:t>
+            </a:r>
+            <a:r>
+              <a:rPr lang="en-US" dirty="0" err="1"/>
+              <a:t>zu</a:t>
+            </a:r>
+            <a:r>
+              <a:rPr lang="en-US" dirty="0"/>
+              <a:t> </a:t>
+            </a:r>
+            <a:r>
+              <a:rPr lang="en-US" dirty="0" err="1"/>
+              <a:t>unterstreichen</a:t>
+            </a:r>
+            <a:r>
+              <a:rPr lang="en-US" dirty="0"/>
+              <a:t>. </a:t>
+            </a:r>
+          </a:p>
+          <a:p>
+            <a:endParaRPr lang="en-US" dirty="0"/>
+          </a:p>
+          <a:p>
+            <a:r>
+              <a:rPr lang="en-US" dirty="0" err="1"/>
+              <a:t>Begrenzt</a:t>
+            </a:r>
+            <a:r>
+              <a:rPr lang="en-US" dirty="0"/>
+              <a:t> auf Europa, um Representativeness-</a:t>
+            </a:r>
+            <a:r>
+              <a:rPr lang="en-US" dirty="0" err="1"/>
+              <a:t>Probleme</a:t>
+            </a:r>
+            <a:r>
+              <a:rPr lang="en-US" dirty="0"/>
+              <a:t> in Quality Control </a:t>
+            </a:r>
+            <a:r>
+              <a:rPr lang="en-US" dirty="0" err="1"/>
+              <a:t>zu</a:t>
+            </a:r>
+            <a:r>
+              <a:rPr lang="en-US" dirty="0"/>
+              <a:t> </a:t>
+            </a:r>
+            <a:r>
+              <a:rPr lang="en-US" dirty="0" err="1"/>
+              <a:t>diskutieren</a:t>
+            </a:r>
+            <a:r>
+              <a:rPr lang="en-US" dirty="0"/>
+              <a:t>.</a:t>
+            </a:r>
           </a:p>
         </p:txBody>
       </p:sp>
@@ -1795,7 +2631,176 @@
           <a:bodyPr/>
           <a:lstStyle/>
           <a:p>
-            <a:endParaRPr lang="en-US"/>
+            <a:r>
+              <a:rPr lang="en-US" dirty="0" err="1"/>
+              <a:t>Definiert</a:t>
+            </a:r>
+            <a:r>
+              <a:rPr lang="en-US" dirty="0"/>
+              <a:t> RQ, um Plan-Schritt </a:t>
+            </a:r>
+            <a:r>
+              <a:rPr lang="en-US" dirty="0" err="1"/>
+              <a:t>zu</a:t>
+            </a:r>
+            <a:r>
+              <a:rPr lang="en-US" dirty="0"/>
+              <a:t> </a:t>
+            </a:r>
+            <a:r>
+              <a:rPr lang="en-US" dirty="0" err="1"/>
+              <a:t>starten</a:t>
+            </a:r>
+            <a:r>
+              <a:rPr lang="en-US" dirty="0"/>
+              <a:t>: </a:t>
+            </a:r>
+            <a:r>
+              <a:rPr lang="en-US" dirty="0" err="1"/>
+              <a:t>Triviale</a:t>
+            </a:r>
+            <a:r>
+              <a:rPr lang="en-US" dirty="0"/>
+              <a:t> Frage </a:t>
+            </a:r>
+            <a:r>
+              <a:rPr lang="en-US" dirty="0" err="1"/>
+              <a:t>fokussiert</a:t>
+            </a:r>
+            <a:r>
+              <a:rPr lang="en-US" dirty="0"/>
+              <a:t> auf Management, </a:t>
+            </a:r>
+            <a:r>
+              <a:rPr lang="en-US" dirty="0" err="1"/>
+              <a:t>nicht</a:t>
+            </a:r>
+            <a:r>
+              <a:rPr lang="en-US" dirty="0"/>
+              <a:t> </a:t>
+            </a:r>
+            <a:r>
+              <a:rPr lang="en-US" dirty="0" err="1"/>
+              <a:t>Analyse</a:t>
+            </a:r>
+            <a:r>
+              <a:rPr lang="en-US" dirty="0"/>
+              <a:t>. </a:t>
+            </a:r>
+          </a:p>
+          <a:p>
+            <a:r>
+              <a:rPr lang="en-US" dirty="0" err="1"/>
+              <a:t>Hypothese</a:t>
+            </a:r>
+            <a:r>
+              <a:rPr lang="en-US" dirty="0"/>
+              <a:t> </a:t>
+            </a:r>
+            <a:r>
+              <a:rPr lang="en-US" dirty="0" err="1"/>
+              <a:t>formuliert</a:t>
+            </a:r>
+            <a:r>
+              <a:rPr lang="en-US" dirty="0"/>
+              <a:t>, um Integration und </a:t>
+            </a:r>
+            <a:r>
+              <a:rPr lang="en-US" dirty="0" err="1"/>
+              <a:t>Analyse</a:t>
+            </a:r>
+            <a:r>
+              <a:rPr lang="en-US" dirty="0"/>
+              <a:t> </a:t>
+            </a:r>
+            <a:r>
+              <a:rPr lang="en-US" dirty="0" err="1"/>
+              <a:t>vorzubereiten</a:t>
+            </a:r>
+            <a:r>
+              <a:rPr lang="en-US" dirty="0"/>
+              <a:t>. </a:t>
+            </a:r>
+          </a:p>
+          <a:p>
+            <a:r>
+              <a:rPr lang="en-US" dirty="0" err="1"/>
+              <a:t>Erklärt</a:t>
+            </a:r>
+            <a:r>
+              <a:rPr lang="en-US" dirty="0"/>
+              <a:t> </a:t>
+            </a:r>
+            <a:r>
+              <a:rPr lang="en-US" dirty="0" err="1"/>
+              <a:t>Fokus</a:t>
+            </a:r>
+            <a:r>
+              <a:rPr lang="en-US" dirty="0"/>
+              <a:t> auf Data Management, um Lifecycle-</a:t>
+            </a:r>
+            <a:r>
+              <a:rPr lang="en-US" dirty="0" err="1"/>
+              <a:t>Priorität</a:t>
+            </a:r>
+            <a:r>
+              <a:rPr lang="en-US" dirty="0"/>
+              <a:t> in </a:t>
+            </a:r>
+            <a:r>
+              <a:rPr lang="en-US" dirty="0" err="1"/>
+              <a:t>MoSD</a:t>
+            </a:r>
+            <a:r>
+              <a:rPr lang="en-US" dirty="0"/>
+              <a:t> </a:t>
+            </a:r>
+            <a:r>
+              <a:rPr lang="en-US" dirty="0" err="1"/>
+              <a:t>zu</a:t>
+            </a:r>
+            <a:r>
+              <a:rPr lang="en-US" dirty="0"/>
+              <a:t> </a:t>
+            </a:r>
+            <a:r>
+              <a:rPr lang="en-US" dirty="0" err="1"/>
+              <a:t>betonen</a:t>
+            </a:r>
+            <a:r>
+              <a:rPr lang="en-US" dirty="0"/>
+              <a:t>. </a:t>
+            </a:r>
+          </a:p>
+          <a:p>
+            <a:r>
+              <a:rPr lang="en-US" dirty="0"/>
+              <a:t>Ermöglicht </a:t>
+            </a:r>
+            <a:r>
+              <a:rPr lang="en-US" dirty="0" err="1"/>
+              <a:t>Korrelations-Prüfung</a:t>
+            </a:r>
+            <a:r>
+              <a:rPr lang="en-US" dirty="0"/>
+              <a:t> in Analyze, </a:t>
+            </a:r>
+            <a:r>
+              <a:rPr lang="en-US" dirty="0" err="1"/>
+              <a:t>mit</a:t>
+            </a:r>
+            <a:r>
+              <a:rPr lang="en-US" dirty="0"/>
+              <a:t> Tools </a:t>
+            </a:r>
+            <a:r>
+              <a:rPr lang="en-US" dirty="0" err="1"/>
+              <a:t>wie</a:t>
+            </a:r>
+            <a:r>
+              <a:rPr lang="en-US" dirty="0"/>
+              <a:t> Pandas.</a:t>
+            </a:r>
           </a:p>
         </p:txBody>
       </p:sp>
@@ -1903,7 +2908,114 @@
           <a:bodyPr/>
           <a:lstStyle/>
           <a:p>
-            <a:endParaRPr lang="en-US"/>
+            <a:r>
+              <a:rPr lang="en-US" dirty="0" err="1"/>
+              <a:t>Visualisiert</a:t>
+            </a:r>
+            <a:r>
+              <a:rPr lang="en-US" dirty="0"/>
+              <a:t> Lifecycle-</a:t>
+            </a:r>
+            <a:r>
+              <a:rPr lang="en-US" dirty="0" err="1"/>
+              <a:t>Diagramm</a:t>
+            </a:r>
+            <a:r>
+              <a:rPr lang="en-US" dirty="0"/>
+              <a:t>, um </a:t>
+            </a:r>
+            <a:r>
+              <a:rPr lang="en-US" dirty="0" err="1"/>
+              <a:t>MoSD-Kernkonzept</a:t>
+            </a:r>
+            <a:r>
+              <a:rPr lang="en-US" dirty="0"/>
+              <a:t> </a:t>
+            </a:r>
+            <a:r>
+              <a:rPr lang="en-US" dirty="0" err="1"/>
+              <a:t>zu</a:t>
+            </a:r>
+            <a:r>
+              <a:rPr lang="en-US" dirty="0"/>
+              <a:t> </a:t>
+            </a:r>
+            <a:r>
+              <a:rPr lang="en-US" dirty="0" err="1"/>
+              <a:t>demonstrieren</a:t>
+            </a:r>
+            <a:r>
+              <a:rPr lang="en-US" dirty="0"/>
+              <a:t>: </a:t>
+            </a:r>
+            <a:r>
+              <a:rPr lang="en-US" dirty="0" err="1"/>
+              <a:t>Systematischer</a:t>
+            </a:r>
+            <a:r>
+              <a:rPr lang="en-US" dirty="0"/>
+              <a:t> Ansatz von Plan bis Analyze. </a:t>
+            </a:r>
+          </a:p>
+          <a:p>
+            <a:r>
+              <a:rPr lang="en-US" dirty="0" err="1"/>
+              <a:t>Integriert</a:t>
+            </a:r>
+            <a:r>
+              <a:rPr lang="en-US" dirty="0"/>
+              <a:t> alle </a:t>
+            </a:r>
+            <a:r>
+              <a:rPr lang="en-US" dirty="0" err="1"/>
+              <a:t>Schritte</a:t>
+            </a:r>
+            <a:r>
+              <a:rPr lang="en-US" dirty="0"/>
+              <a:t>, um Workflow in DMP </a:t>
+            </a:r>
+            <a:r>
+              <a:rPr lang="en-US" dirty="0" err="1"/>
+              <a:t>zu</a:t>
+            </a:r>
+            <a:r>
+              <a:rPr lang="en-US" dirty="0"/>
+              <a:t> </a:t>
+            </a:r>
+            <a:r>
+              <a:rPr lang="en-US" dirty="0" err="1"/>
+              <a:t>spiegeln</a:t>
+            </a:r>
+            <a:r>
+              <a:rPr lang="en-US" dirty="0"/>
+              <a:t>. </a:t>
+            </a:r>
+          </a:p>
+          <a:p>
+            <a:r>
+              <a:rPr lang="en-US" dirty="0" err="1"/>
+              <a:t>Zeigt</a:t>
+            </a:r>
+            <a:r>
+              <a:rPr lang="en-US" dirty="0"/>
+              <a:t> Iteration (z. B. Preserve </a:t>
+            </a:r>
+            <a:r>
+              <a:rPr lang="en-US" dirty="0" err="1"/>
+              <a:t>nach</a:t>
+            </a:r>
+            <a:r>
+              <a:rPr lang="en-US" dirty="0"/>
+              <a:t> Describe), für </a:t>
+            </a:r>
+            <a:r>
+              <a:rPr lang="en-US" dirty="0" err="1"/>
+              <a:t>Reproduzierbarkeit</a:t>
+            </a:r>
+            <a:r>
+              <a:rPr lang="en-US" dirty="0"/>
+              <a:t>.</a:t>
+            </a:r>
           </a:p>
         </p:txBody>
       </p:sp>
@@ -2011,7 +3123,144 @@
           <a:bodyPr/>
           <a:lstStyle/>
           <a:p>
-            <a:endParaRPr lang="en-US"/>
+            <a:r>
+              <a:rPr lang="en-US" dirty="0" err="1"/>
+              <a:t>Nutzt</a:t>
+            </a:r>
+            <a:r>
+              <a:rPr lang="en-US" dirty="0"/>
+              <a:t> Horizon-Template für DMP, um </a:t>
+            </a:r>
+            <a:r>
+              <a:rPr lang="en-US" dirty="0" err="1"/>
+              <a:t>standardisiertes</a:t>
+            </a:r>
+            <a:r>
+              <a:rPr lang="en-US" dirty="0"/>
+              <a:t> Planning in </a:t>
+            </a:r>
+            <a:r>
+              <a:rPr lang="en-US" dirty="0" err="1"/>
+              <a:t>MoSD</a:t>
+            </a:r>
+            <a:r>
+              <a:rPr lang="en-US" dirty="0"/>
+              <a:t> </a:t>
+            </a:r>
+            <a:r>
+              <a:rPr lang="en-US" dirty="0" err="1"/>
+              <a:t>zu</a:t>
+            </a:r>
+            <a:r>
+              <a:rPr lang="en-US" dirty="0"/>
+              <a:t> </a:t>
+            </a:r>
+            <a:r>
+              <a:rPr lang="en-US" dirty="0" err="1"/>
+              <a:t>zeigen</a:t>
+            </a:r>
+            <a:r>
+              <a:rPr lang="en-US" dirty="0"/>
+              <a:t>. </a:t>
+            </a:r>
+          </a:p>
+          <a:p>
+            <a:r>
+              <a:rPr lang="en-US" dirty="0"/>
+              <a:t>"Living document" via GitHub, um Provenance und Updates </a:t>
+            </a:r>
+            <a:r>
+              <a:rPr lang="en-US" dirty="0" err="1"/>
+              <a:t>zu</a:t>
+            </a:r>
+            <a:r>
+              <a:rPr lang="en-US" dirty="0"/>
+              <a:t> </a:t>
+            </a:r>
+            <a:r>
+              <a:rPr lang="en-US" dirty="0" err="1"/>
+              <a:t>ermöglichen</a:t>
+            </a:r>
+            <a:r>
+              <a:rPr lang="en-US" dirty="0"/>
+              <a:t>. </a:t>
+            </a:r>
+          </a:p>
+          <a:p>
+            <a:r>
+              <a:rPr lang="en-US" dirty="0"/>
+              <a:t>README &amp; MIT-</a:t>
+            </a:r>
+            <a:r>
+              <a:rPr lang="en-US" dirty="0" err="1"/>
+              <a:t>Lizenz</a:t>
+            </a:r>
+            <a:r>
+              <a:rPr lang="en-US" dirty="0"/>
+              <a:t>, um Accessible und Re-usable </a:t>
+            </a:r>
+            <a:r>
+              <a:rPr lang="en-US" dirty="0" err="1"/>
+              <a:t>zu</a:t>
+            </a:r>
+            <a:r>
+              <a:rPr lang="en-US" dirty="0"/>
+              <a:t> </a:t>
+            </a:r>
+            <a:r>
+              <a:rPr lang="en-US" dirty="0" err="1"/>
+              <a:t>machen</a:t>
+            </a:r>
+            <a:r>
+              <a:rPr lang="en-US" dirty="0"/>
+              <a:t> (FAIR). </a:t>
+            </a:r>
+          </a:p>
+          <a:p>
+            <a:r>
+              <a:rPr lang="en-US" dirty="0"/>
+              <a:t>Workflow-</a:t>
+            </a:r>
+            <a:r>
+              <a:rPr lang="en-US" dirty="0" err="1"/>
+              <a:t>Beschreibung</a:t>
+            </a:r>
+            <a:r>
+              <a:rPr lang="en-US" dirty="0"/>
+              <a:t>, um </a:t>
+            </a:r>
+            <a:r>
+              <a:rPr lang="en-US" dirty="0" err="1"/>
+              <a:t>schrittweise</a:t>
+            </a:r>
+            <a:r>
+              <a:rPr lang="en-US" dirty="0"/>
+              <a:t> </a:t>
+            </a:r>
+            <a:r>
+              <a:rPr lang="en-US" dirty="0" err="1"/>
+              <a:t>Dokumentation</a:t>
+            </a:r>
+            <a:r>
+              <a:rPr lang="en-US" dirty="0"/>
+              <a:t> </a:t>
+            </a:r>
+            <a:r>
+              <a:rPr lang="en-US" dirty="0" err="1"/>
+              <a:t>zu</a:t>
+            </a:r>
+            <a:r>
+              <a:rPr lang="en-US" dirty="0"/>
+              <a:t> </a:t>
+            </a:r>
+            <a:r>
+              <a:rPr lang="en-US" dirty="0" err="1"/>
+              <a:t>illustrieren</a:t>
+            </a:r>
+            <a:r>
+              <a:rPr lang="en-US" dirty="0"/>
+              <a:t>.</a:t>
+            </a:r>
           </a:p>
         </p:txBody>
       </p:sp>
@@ -2119,7 +3368,128 @@
           <a:bodyPr/>
           <a:lstStyle/>
           <a:p>
-            <a:endParaRPr lang="en-US"/>
+            <a:r>
+              <a:rPr lang="en-US" dirty="0" err="1"/>
+              <a:t>Beschreibt</a:t>
+            </a:r>
+            <a:r>
+              <a:rPr lang="en-US" dirty="0"/>
+              <a:t> </a:t>
+            </a:r>
+            <a:r>
+              <a:rPr lang="en-US" dirty="0" err="1"/>
+              <a:t>Datenstruktur</a:t>
+            </a:r>
+            <a:r>
+              <a:rPr lang="en-US" dirty="0"/>
+              <a:t> und </a:t>
+            </a:r>
+            <a:r>
+              <a:rPr lang="en-US" dirty="0" err="1"/>
+              <a:t>Formate</a:t>
+            </a:r>
+            <a:r>
+              <a:rPr lang="en-US" dirty="0"/>
+              <a:t>, um Collect in Lifecycle </a:t>
+            </a:r>
+            <a:r>
+              <a:rPr lang="en-US" dirty="0" err="1"/>
+              <a:t>abzudecken</a:t>
+            </a:r>
+            <a:r>
+              <a:rPr lang="en-US" dirty="0"/>
+              <a:t>. </a:t>
+            </a:r>
+          </a:p>
+          <a:p>
+            <a:r>
+              <a:rPr lang="en-US" dirty="0" err="1"/>
+              <a:t>Erwähnt</a:t>
+            </a:r>
+            <a:r>
+              <a:rPr lang="en-US" dirty="0"/>
+              <a:t> web-scraping, um </a:t>
+            </a:r>
+            <a:r>
+              <a:rPr lang="en-US" dirty="0" err="1"/>
+              <a:t>Automatisierung</a:t>
+            </a:r>
+            <a:r>
+              <a:rPr lang="en-US" dirty="0"/>
+              <a:t> in Data Acquisition </a:t>
+            </a:r>
+            <a:r>
+              <a:rPr lang="en-US" dirty="0" err="1"/>
+              <a:t>zu</a:t>
+            </a:r>
+            <a:r>
+              <a:rPr lang="en-US" dirty="0"/>
+              <a:t> </a:t>
+            </a:r>
+            <a:r>
+              <a:rPr lang="en-US" dirty="0" err="1"/>
+              <a:t>zeigen</a:t>
+            </a:r>
+            <a:r>
+              <a:rPr lang="en-US" dirty="0"/>
+              <a:t>. </a:t>
+            </a:r>
+          </a:p>
+          <a:p>
+            <a:r>
+              <a:rPr lang="en-US" dirty="0" err="1"/>
+              <a:t>Adressiert</a:t>
+            </a:r>
+            <a:r>
+              <a:rPr lang="en-US" dirty="0"/>
+              <a:t> Naming-Issues (</a:t>
+            </a:r>
+            <a:r>
+              <a:rPr lang="en-US" dirty="0" err="1"/>
+              <a:t>data.csv</a:t>
+            </a:r>
+            <a:r>
+              <a:rPr lang="en-US" dirty="0"/>
+              <a:t>), um Consistency-</a:t>
+            </a:r>
+            <a:r>
+              <a:rPr lang="en-US" dirty="0" err="1"/>
+              <a:t>Probleme</a:t>
+            </a:r>
+            <a:r>
+              <a:rPr lang="en-US" dirty="0"/>
+              <a:t> </a:t>
+            </a:r>
+            <a:r>
+              <a:rPr lang="en-US" dirty="0" err="1"/>
+              <a:t>vorwegzunehmen</a:t>
+            </a:r>
+            <a:r>
+              <a:rPr lang="en-US" dirty="0"/>
+              <a:t>. </a:t>
+            </a:r>
+          </a:p>
+          <a:p>
+            <a:r>
+              <a:rPr lang="en-US" dirty="0"/>
+              <a:t>Europa-</a:t>
+            </a:r>
+            <a:r>
+              <a:rPr lang="en-US" dirty="0" err="1"/>
+              <a:t>Beschränkung</a:t>
+            </a:r>
+            <a:r>
+              <a:rPr lang="en-US" dirty="0"/>
+              <a:t>, um Representativeness in Assure </a:t>
+            </a:r>
+            <a:r>
+              <a:rPr lang="en-US" dirty="0" err="1"/>
+              <a:t>vorzubereiten</a:t>
+            </a:r>
+            <a:r>
+              <a:rPr lang="en-US" dirty="0"/>
+              <a:t>.</a:t>
+            </a:r>
           </a:p>
         </p:txBody>
       </p:sp>
@@ -2287,6 +3657,109 @@
               </a:rPr>
               <a:t> all tests performed (i.e. both PCR and antigen tests).</a:t>
             </a:r>
+          </a:p>
+          <a:p>
+            <a:endParaRPr lang="en-US" sz="1200" b="1" i="0" kern="1200" dirty="0">
+              <a:solidFill>
+                <a:schemeClr val="tx1"/>
+              </a:solidFill>
+              <a:effectLst/>
+              <a:latin typeface="+mn-lt"/>
+              <a:ea typeface="+mn-ea"/>
+              <a:cs typeface="+mn-cs"/>
+            </a:endParaRPr>
+          </a:p>
+          <a:p>
+            <a:r>
+              <a:rPr lang="en-US" dirty="0" err="1"/>
+              <a:t>Identifiziert</a:t>
+            </a:r>
+            <a:r>
+              <a:rPr lang="en-US" dirty="0"/>
+              <a:t> </a:t>
+            </a:r>
+            <a:r>
+              <a:rPr lang="en-US" dirty="0" err="1"/>
+              <a:t>Quellen</a:t>
+            </a:r>
+            <a:r>
+              <a:rPr lang="en-US" dirty="0"/>
+              <a:t> (</a:t>
+            </a:r>
+            <a:r>
+              <a:rPr lang="en-US" dirty="0" err="1"/>
+              <a:t>TESSy</a:t>
+            </a:r>
+            <a:r>
+              <a:rPr lang="en-US" dirty="0"/>
+              <a:t>/public), um Origin und Multi-Source-</a:t>
+            </a:r>
+            <a:r>
+              <a:rPr lang="en-US" dirty="0" err="1"/>
+              <a:t>Probleme</a:t>
+            </a:r>
+            <a:r>
+              <a:rPr lang="en-US" dirty="0"/>
+              <a:t> </a:t>
+            </a:r>
+            <a:r>
+              <a:rPr lang="en-US" dirty="0" err="1"/>
+              <a:t>zu</a:t>
+            </a:r>
+            <a:r>
+              <a:rPr lang="en-US" dirty="0"/>
+              <a:t> </a:t>
+            </a:r>
+            <a:r>
+              <a:rPr lang="en-US" dirty="0" err="1"/>
+              <a:t>dokumentieren</a:t>
+            </a:r>
+            <a:r>
+              <a:rPr lang="en-US" dirty="0"/>
+              <a:t> (Provenance). </a:t>
+            </a:r>
+          </a:p>
+          <a:p>
+            <a:r>
+              <a:rPr lang="en-US" dirty="0" err="1"/>
+              <a:t>Hebt</a:t>
+            </a:r>
+            <a:r>
+              <a:rPr lang="en-US" dirty="0"/>
+              <a:t> </a:t>
+            </a:r>
+            <a:r>
+              <a:rPr lang="en-US" dirty="0" err="1"/>
+              <a:t>Qualitätsunsicherheit</a:t>
+            </a:r>
+            <a:r>
+              <a:rPr lang="en-US" dirty="0"/>
+              <a:t> </a:t>
+            </a:r>
+            <a:r>
+              <a:rPr lang="en-US" dirty="0" err="1"/>
+              <a:t>bei</a:t>
+            </a:r>
+            <a:r>
+              <a:rPr lang="en-US" dirty="0"/>
+              <a:t> public sources </a:t>
+            </a:r>
+            <a:r>
+              <a:rPr lang="en-US" dirty="0" err="1"/>
+              <a:t>hervor</a:t>
+            </a:r>
+            <a:r>
+              <a:rPr lang="en-US" dirty="0"/>
+              <a:t>, um Assure-Schritt </a:t>
+            </a:r>
+            <a:r>
+              <a:rPr lang="en-US" dirty="0" err="1"/>
+              <a:t>einzuleiten</a:t>
+            </a:r>
+            <a:r>
+              <a:rPr lang="en-US" dirty="0"/>
+              <a:t>.</a:t>
+            </a:r>
             <a:br>
               <a:rPr lang="en-US" dirty="0"/>
             </a:br>
@@ -2398,7 +3871,130 @@
           <a:bodyPr/>
           <a:lstStyle/>
           <a:p>
-            <a:endParaRPr lang="en-US"/>
+            <a:r>
+              <a:rPr lang="en-US" dirty="0" err="1"/>
+              <a:t>Prüft</a:t>
+            </a:r>
+            <a:r>
+              <a:rPr lang="en-US" dirty="0"/>
+              <a:t> Completeness </a:t>
+            </a:r>
+            <a:r>
+              <a:rPr lang="en-US" dirty="0" err="1"/>
+              <a:t>mit</a:t>
+            </a:r>
+            <a:r>
+              <a:rPr lang="en-US" dirty="0"/>
+              <a:t> </a:t>
+            </a:r>
+            <a:r>
+              <a:rPr lang="en-US" dirty="0" err="1"/>
+              <a:t>NaN-Prozenten</a:t>
+            </a:r>
+            <a:r>
+              <a:rPr lang="en-US" dirty="0"/>
+              <a:t>, um Data Quality in </a:t>
+            </a:r>
+            <a:r>
+              <a:rPr lang="en-US" dirty="0" err="1"/>
+              <a:t>MoSD</a:t>
+            </a:r>
+            <a:r>
+              <a:rPr lang="en-US" dirty="0"/>
+              <a:t> </a:t>
+            </a:r>
+            <a:r>
+              <a:rPr lang="en-US" dirty="0" err="1"/>
+              <a:t>zu</a:t>
+            </a:r>
+            <a:r>
+              <a:rPr lang="en-US" dirty="0"/>
+              <a:t> </a:t>
+            </a:r>
+            <a:r>
+              <a:rPr lang="en-US" dirty="0" err="1"/>
+              <a:t>sichern</a:t>
+            </a:r>
+            <a:r>
+              <a:rPr lang="en-US" dirty="0"/>
+              <a:t>. </a:t>
+            </a:r>
+          </a:p>
+          <a:p>
+            <a:r>
+              <a:rPr lang="en-US" dirty="0"/>
+              <a:t>Uniqueness via </a:t>
+            </a:r>
+            <a:r>
+              <a:rPr lang="en-US" dirty="0" err="1"/>
+              <a:t>Sortierung</a:t>
+            </a:r>
+            <a:r>
+              <a:rPr lang="en-US" dirty="0"/>
+              <a:t>, um </a:t>
+            </a:r>
+            <a:r>
+              <a:rPr lang="en-US" dirty="0" err="1"/>
+              <a:t>Duplikate</a:t>
+            </a:r>
+            <a:r>
+              <a:rPr lang="en-US" dirty="0"/>
+              <a:t> </a:t>
+            </a:r>
+            <a:r>
+              <a:rPr lang="en-US" dirty="0" err="1"/>
+              <a:t>zu</a:t>
+            </a:r>
+            <a:r>
+              <a:rPr lang="en-US" dirty="0"/>
+              <a:t> </a:t>
+            </a:r>
+            <a:r>
+              <a:rPr lang="en-US" dirty="0" err="1"/>
+              <a:t>vermeiden</a:t>
+            </a:r>
+            <a:r>
+              <a:rPr lang="en-US" dirty="0"/>
+              <a:t>. </a:t>
+            </a:r>
+          </a:p>
+          <a:p>
+            <a:r>
+              <a:rPr lang="en-US" dirty="0"/>
+              <a:t>Timeliness-</a:t>
+            </a:r>
+            <a:r>
+              <a:rPr lang="en-US" dirty="0" err="1"/>
+              <a:t>Bewertung</a:t>
+            </a:r>
+            <a:r>
+              <a:rPr lang="en-US" dirty="0"/>
+              <a:t>, um </a:t>
+            </a:r>
+            <a:r>
+              <a:rPr lang="en-US" dirty="0" err="1"/>
+              <a:t>Pandemie-Kontext</a:t>
+            </a:r>
+            <a:r>
+              <a:rPr lang="en-US" dirty="0"/>
+              <a:t> </a:t>
+            </a:r>
+            <a:r>
+              <a:rPr lang="en-US" dirty="0" err="1"/>
+              <a:t>zu</a:t>
+            </a:r>
+            <a:r>
+              <a:rPr lang="en-US" dirty="0"/>
+              <a:t> </a:t>
+            </a:r>
+            <a:r>
+              <a:rPr lang="en-US" dirty="0" err="1"/>
+              <a:t>berücksichtigen</a:t>
+            </a:r>
+            <a:r>
+              <a:rPr lang="en-US" dirty="0"/>
+              <a:t>.</a:t>
+            </a:r>
           </a:p>
         </p:txBody>
       </p:sp>
@@ -2506,7 +4102,142 @@
           <a:bodyPr/>
           <a:lstStyle/>
           <a:p>
-            <a:endParaRPr lang="en-US"/>
+            <a:r>
+              <a:rPr lang="en-US" dirty="0"/>
+              <a:t>Validity (</a:t>
+            </a:r>
+            <a:r>
+              <a:rPr lang="en-US" dirty="0" err="1"/>
+              <a:t>valide</a:t>
+            </a:r>
+            <a:r>
+              <a:rPr lang="en-US" dirty="0"/>
+              <a:t> </a:t>
+            </a:r>
+            <a:r>
+              <a:rPr lang="en-US" dirty="0" err="1"/>
+              <a:t>Spalten</a:t>
+            </a:r>
+            <a:r>
+              <a:rPr lang="en-US" dirty="0"/>
+              <a:t>, NA-Handling), um </a:t>
+            </a:r>
+            <a:r>
+              <a:rPr lang="en-US" dirty="0" err="1"/>
+              <a:t>Datenintegrität</a:t>
+            </a:r>
+            <a:r>
+              <a:rPr lang="en-US" dirty="0"/>
+              <a:t> </a:t>
+            </a:r>
+            <a:r>
+              <a:rPr lang="en-US" dirty="0" err="1"/>
+              <a:t>zu</a:t>
+            </a:r>
+            <a:r>
+              <a:rPr lang="en-US" dirty="0"/>
+              <a:t> </a:t>
+            </a:r>
+            <a:r>
+              <a:rPr lang="en-US" dirty="0" err="1"/>
+              <a:t>gewährleisten</a:t>
+            </a:r>
+            <a:r>
+              <a:rPr lang="en-US" dirty="0"/>
+              <a:t>. </a:t>
+            </a:r>
+          </a:p>
+          <a:p>
+            <a:r>
+              <a:rPr lang="en-US" dirty="0"/>
+              <a:t>Accuracy (</a:t>
+            </a:r>
+            <a:r>
+              <a:rPr lang="en-US" dirty="0" err="1"/>
+              <a:t>keine</a:t>
+            </a:r>
+            <a:r>
+              <a:rPr lang="en-US" dirty="0"/>
+              <a:t> </a:t>
+            </a:r>
+            <a:r>
+              <a:rPr lang="en-US" dirty="0" err="1"/>
+              <a:t>Duplikate</a:t>
+            </a:r>
+            <a:r>
+              <a:rPr lang="en-US" dirty="0"/>
+              <a:t>, </a:t>
+            </a:r>
+            <a:r>
+              <a:rPr lang="en-US" dirty="0" err="1"/>
+              <a:t>vernünftige</a:t>
+            </a:r>
+            <a:r>
+              <a:rPr lang="en-US" dirty="0"/>
+              <a:t> </a:t>
+            </a:r>
+            <a:r>
+              <a:rPr lang="en-US" dirty="0" err="1"/>
+              <a:t>Werte</a:t>
+            </a:r>
+            <a:r>
+              <a:rPr lang="en-US" dirty="0"/>
+              <a:t>), um Reliability </a:t>
+            </a:r>
+            <a:r>
+              <a:rPr lang="en-US" dirty="0" err="1"/>
+              <a:t>zu</a:t>
+            </a:r>
+            <a:r>
+              <a:rPr lang="en-US" dirty="0"/>
+              <a:t> </a:t>
+            </a:r>
+            <a:r>
+              <a:rPr lang="en-US" dirty="0" err="1"/>
+              <a:t>prüfen</a:t>
+            </a:r>
+            <a:r>
+              <a:rPr lang="en-US" dirty="0"/>
+              <a:t>. </a:t>
+            </a:r>
+          </a:p>
+          <a:p>
+            <a:r>
+              <a:rPr lang="en-US" dirty="0"/>
+              <a:t>Consistency (</a:t>
+            </a:r>
+            <a:r>
+              <a:rPr lang="en-US" dirty="0" err="1"/>
+              <a:t>Inkonsistenzen</a:t>
+            </a:r>
+            <a:r>
+              <a:rPr lang="en-US" dirty="0"/>
+              <a:t> </a:t>
+            </a:r>
+            <a:r>
+              <a:rPr lang="en-US" dirty="0" err="1"/>
+              <a:t>wie</a:t>
+            </a:r>
+            <a:r>
+              <a:rPr lang="en-US" dirty="0"/>
+              <a:t> Codes), um Multi-Source-Issues </a:t>
+            </a:r>
+            <a:r>
+              <a:rPr lang="en-US" dirty="0" err="1"/>
+              <a:t>zu</a:t>
+            </a:r>
+            <a:r>
+              <a:rPr lang="en-US" dirty="0"/>
+              <a:t> </a:t>
+            </a:r>
+            <a:r>
+              <a:rPr lang="en-US" dirty="0" err="1"/>
+              <a:t>beheben</a:t>
+            </a:r>
+            <a:r>
+              <a:rPr lang="en-US" dirty="0"/>
+              <a:t>.</a:t>
+            </a:r>
           </a:p>
         </p:txBody>
       </p:sp>
@@ -5713,6 +7444,16 @@
           <a:prstGeom prst="rect">
             <a:avLst/>
           </a:prstGeom>
+          <a:ln>
+            <a:noFill/>
+          </a:ln>
+          <a:effectLst>
+            <a:outerShdw blurRad="292100" dist="139700" dir="2700000" algn="tl" rotWithShape="0">
+              <a:srgbClr val="333333">
+                <a:alpha val="65000"/>
+              </a:srgbClr>
+            </a:outerShdw>
+          </a:effectLst>
         </p:spPr>
       </p:pic>
     </p:spTree>
@@ -6007,10 +7748,15 @@
             <p:ph sz="half" idx="2"/>
           </p:nvPr>
         </p:nvSpPr>
-        <p:spPr/>
+        <p:spPr>
+          <a:xfrm>
+            <a:off x="452438" y="1095375"/>
+            <a:ext cx="8239125" cy="2952750"/>
+          </a:xfrm>
+        </p:spPr>
         <p:txBody>
           <a:bodyPr>
-            <a:normAutofit/>
+            <a:noAutofit/>
           </a:bodyPr>
           <a:lstStyle/>
           <a:p>
@@ -6033,42 +7779,42 @@
               </a:buClr>
             </a:pPr>
             <a:r>
-              <a:rPr lang="en-US" sz="1800" dirty="0" err="1"/>
+              <a:rPr lang="en-US" dirty="0" err="1"/>
               <a:t>Spalten</a:t>
             </a:r>
             <a:r>
-              <a:rPr lang="en-US" sz="1800" dirty="0"/>
+              <a:rPr lang="en-US" dirty="0"/>
               <a:t> </a:t>
             </a:r>
             <a:r>
-              <a:rPr lang="en-US" sz="1800" dirty="0" err="1"/>
+              <a:rPr lang="en-US" dirty="0" err="1"/>
               <a:t>sind</a:t>
             </a:r>
             <a:r>
-              <a:rPr lang="en-US" sz="1800" dirty="0"/>
+              <a:rPr lang="en-US" dirty="0"/>
               <a:t> </a:t>
             </a:r>
             <a:r>
-              <a:rPr lang="en-US" sz="1800" dirty="0" err="1"/>
+              <a:rPr lang="en-US" dirty="0" err="1"/>
               <a:t>valide</a:t>
             </a:r>
             <a:r>
-              <a:rPr lang="en-US" sz="1800" dirty="0"/>
+              <a:rPr lang="en-US" dirty="0"/>
               <a:t>, </a:t>
             </a:r>
             <a:r>
-              <a:rPr lang="en-US" sz="1800" dirty="0" err="1"/>
+              <a:rPr lang="en-US" dirty="0" err="1"/>
               <a:t>konkret</a:t>
             </a:r>
             <a:r>
-              <a:rPr lang="en-US" sz="1800" dirty="0"/>
+              <a:rPr lang="en-US" dirty="0"/>
               <a:t> und </a:t>
             </a:r>
             <a:r>
-              <a:rPr lang="en-US" sz="1800" dirty="0" err="1"/>
+              <a:rPr lang="en-US" dirty="0" err="1"/>
               <a:t>selbsterklärend</a:t>
             </a:r>
-            <a:endParaRPr lang="en-US" sz="1800" dirty="0"/>
+            <a:endParaRPr lang="en-US" dirty="0"/>
           </a:p>
           <a:p>
             <a:pPr marL="774900" lvl="1" indent="-342900">
@@ -6077,39 +7823,39 @@
               </a:buClr>
             </a:pPr>
             <a:r>
-              <a:rPr lang="en-US" sz="1800" dirty="0"/>
+              <a:rPr lang="en-US" dirty="0"/>
               <a:t>Bei </a:t>
             </a:r>
             <a:r>
-              <a:rPr lang="en-US" sz="1800" dirty="0" err="1"/>
+              <a:rPr lang="en-US" dirty="0" err="1"/>
               <a:t>fehlenden</a:t>
             </a:r>
             <a:r>
-              <a:rPr lang="en-US" sz="1800" dirty="0"/>
+              <a:rPr lang="en-US" dirty="0"/>
               <a:t> </a:t>
             </a:r>
             <a:r>
-              <a:rPr lang="en-US" sz="1800" dirty="0" err="1"/>
+              <a:rPr lang="en-US" dirty="0" err="1"/>
               <a:t>Werten</a:t>
             </a:r>
             <a:r>
-              <a:rPr lang="en-US" sz="1800" dirty="0"/>
+              <a:rPr lang="en-US" dirty="0"/>
               <a:t> </a:t>
             </a:r>
             <a:r>
-              <a:rPr lang="en-US" sz="1800" dirty="0" err="1"/>
+              <a:rPr lang="en-US" dirty="0" err="1"/>
               <a:t>wird</a:t>
             </a:r>
             <a:r>
-              <a:rPr lang="en-US" sz="1800" dirty="0"/>
+              <a:rPr lang="en-US" dirty="0"/>
               <a:t> </a:t>
             </a:r>
             <a:r>
-              <a:rPr lang="en-US" sz="1800" dirty="0" err="1"/>
+              <a:rPr lang="en-US" dirty="0" err="1"/>
               <a:t>konstant</a:t>
             </a:r>
             <a:r>
-              <a:rPr lang="en-US" sz="1800" dirty="0"/>
+              <a:rPr lang="en-US" dirty="0"/>
               <a:t> NA</a:t>
             </a:r>
           </a:p>
@@ -6127,6 +7873,70 @@
             </a:r>
           </a:p>
           <a:p>
+            <a:pPr marL="774900" lvl="1" indent="-342900">
+              <a:buClr>
+                <a:schemeClr val="accent2"/>
+              </a:buClr>
+            </a:pPr>
+            <a:r>
+              <a:rPr lang="en-US" dirty="0"/>
+              <a:t>Keine </a:t>
+            </a:r>
+            <a:r>
+              <a:rPr lang="en-US" dirty="0" err="1"/>
+              <a:t>Duplikate</a:t>
+            </a:r>
+            <a:endParaRPr lang="en-US" dirty="0"/>
+          </a:p>
+          <a:p>
+            <a:pPr marL="774900" lvl="1" indent="-342900">
+              <a:buClr>
+                <a:schemeClr val="accent2"/>
+              </a:buClr>
+            </a:pPr>
+            <a:r>
+              <a:rPr lang="en-US" dirty="0"/>
+              <a:t>Alle </a:t>
+            </a:r>
+            <a:r>
+              <a:rPr lang="en-US" dirty="0" err="1"/>
+              <a:t>Spalten</a:t>
+            </a:r>
+            <a:r>
+              <a:rPr lang="en-US" dirty="0"/>
+              <a:t> </a:t>
+            </a:r>
+            <a:r>
+              <a:rPr lang="en-US" dirty="0" err="1"/>
+              <a:t>enthalten</a:t>
+            </a:r>
+            <a:r>
+              <a:rPr lang="en-US" dirty="0"/>
+              <a:t> </a:t>
+            </a:r>
+            <a:r>
+              <a:rPr lang="en-US" dirty="0" err="1"/>
+              <a:t>vernünftige</a:t>
+            </a:r>
+            <a:r>
+              <a:rPr lang="en-US" dirty="0"/>
+              <a:t>/</a:t>
+            </a:r>
+            <a:r>
+              <a:rPr lang="en-US" dirty="0" err="1"/>
+              <a:t>erwartbare</a:t>
+            </a:r>
+            <a:r>
+              <a:rPr lang="en-US" dirty="0"/>
+              <a:t> </a:t>
+            </a:r>
+            <a:r>
+              <a:rPr lang="en-US" dirty="0" err="1"/>
+              <a:t>Werte</a:t>
+            </a:r>
+            <a:endParaRPr lang="en-US" dirty="0"/>
+          </a:p>
+          <a:p>
             <a:pPr marL="342900" indent="-342900">
               <a:buClr>
                 <a:schemeClr val="accent2"/>
@@ -6134,19 +7944,72 @@
               <a:buFont typeface="Arial" panose="020B0604020202020204" pitchFamily="34" charset="0"/>
               <a:buChar char="•"/>
             </a:pPr>
-            <a:endParaRPr lang="en-US" sz="2000" b="1" dirty="0"/>
-          </a:p>
-          <a:p>
-            <a:pPr marL="342900" indent="-342900">
+            <a:r>
+              <a:rPr lang="en-US" sz="2000" b="1" dirty="0"/>
+              <a:t>Consistency</a:t>
+            </a:r>
+          </a:p>
+          <a:p>
+            <a:pPr marL="774900" lvl="1" indent="-342900">
               <a:buClr>
                 <a:schemeClr val="accent2"/>
               </a:buClr>
-              <a:buFont typeface="Arial" panose="020B0604020202020204" pitchFamily="34" charset="0"/>
-              <a:buChar char="•"/>
             </a:pPr>
             <a:r>
-              <a:rPr lang="en-US" sz="2000" b="1" dirty="0"/>
-              <a:t>Consistency</a:t>
+              <a:rPr lang="en-US" dirty="0"/>
+              <a:t>Gute </a:t>
+            </a:r>
+            <a:r>
+              <a:rPr lang="en-US" dirty="0" err="1"/>
+              <a:t>Konsistenz</a:t>
+            </a:r>
+            <a:endParaRPr lang="en-US" dirty="0"/>
+          </a:p>
+          <a:p>
+            <a:pPr marL="774900" lvl="1" indent="-342900">
+              <a:buClr>
+                <a:schemeClr val="accent2"/>
+              </a:buClr>
+            </a:pPr>
+            <a:r>
+              <a:rPr lang="en-US" dirty="0" err="1"/>
+              <a:t>Kleinere</a:t>
+            </a:r>
+            <a:r>
+              <a:rPr lang="en-US" dirty="0"/>
+              <a:t> </a:t>
+            </a:r>
+            <a:r>
+              <a:rPr lang="en-US" dirty="0" err="1"/>
+              <a:t>Inkonsistenzen</a:t>
+            </a:r>
+            <a:r>
+              <a:rPr lang="en-US" dirty="0"/>
+              <a:t> </a:t>
+            </a:r>
+            <a:r>
+              <a:rPr lang="en-US" dirty="0" err="1"/>
+              <a:t>zwischen</a:t>
+            </a:r>
+            <a:r>
+              <a:rPr lang="en-US" dirty="0"/>
+              <a:t> </a:t>
+            </a:r>
+            <a:r>
+              <a:rPr lang="en-US" dirty="0" err="1"/>
+              <a:t>Datensätzen</a:t>
+            </a:r>
+            <a:r>
+              <a:rPr lang="en-US" dirty="0"/>
+              <a:t> (</a:t>
+            </a:r>
+            <a:r>
+              <a:rPr lang="en-US" dirty="0" err="1"/>
+              <a:t>Ländercodes</a:t>
+            </a:r>
+            <a:r>
+              <a:rPr lang="en-US" dirty="0"/>
+              <a:t>: AUT/AT, ...)</a:t>
             </a:r>
           </a:p>
         </p:txBody>
@@ -6613,8 +8476,12 @@
               <a:buChar char="•"/>
             </a:pPr>
             <a:r>
+              <a:rPr lang="en-US" sz="2000" b="1" dirty="0"/>
+              <a:t>Aber:</a:t>
+            </a:r>
+            <a:r>
               <a:rPr lang="en-US" sz="2000" dirty="0"/>
-              <a:t>Aber: Daten </a:t>
+              <a:t> Daten </a:t>
             </a:r>
             <a:r>
               <a:rPr lang="en-US" sz="2000" dirty="0" err="1"/>
@@ -7649,7 +9516,7 @@
             </a:r>
             <a:r>
               <a:rPr lang="en-US" sz="2000" dirty="0" err="1"/>
-              <a:t>Zeitpunkt</a:t>
+              <a:t>Zeitpunkten</a:t>
             </a:r>
             <a:r>
               <a:rPr lang="en-US" sz="2000" dirty="0"/>
@@ -7702,7 +9569,7 @@
             </a:r>
             <a:r>
               <a:rPr lang="en-US" sz="2000" dirty="0" err="1"/>
-              <a:t>bei</a:t>
+              <a:t>durch</a:t>
             </a:r>
             <a:r>
               <a:rPr lang="en-US" sz="2000" dirty="0"/>
@@ -9526,10 +11393,10 @@
       </p:sp>
       <p:pic>
         <p:nvPicPr>
-          <p:cNvPr id="23" name="Picture 22" descr="A graph with red and blue lines&#10;&#10;AI-generated content may be incorrect.">
+          <p:cNvPr id="3" name="Picture 2" descr="A graph of a graph showing the number of days&#10;&#10;AI-generated content may be incorrect.">
             <a:extLst>
               <a:ext uri="{FF2B5EF4-FFF2-40B4-BE49-F238E27FC236}">
-                <a16:creationId xmlns:a16="http://schemas.microsoft.com/office/drawing/2014/main" id="{E7816FAA-4ECF-82D5-03D6-3190545293BD}"/>
+                <a16:creationId xmlns:a16="http://schemas.microsoft.com/office/drawing/2014/main" id="{4D222238-ED78-EDAA-3E33-F0A4F19AF3F4}"/>
               </a:ext>
             </a:extLst>
           </p:cNvPr>
@@ -9552,8 +11419,8 @@
         </p:blipFill>
         <p:spPr>
           <a:xfrm>
-            <a:off x="225188" y="1019179"/>
-            <a:ext cx="4162348" cy="2774899"/>
+            <a:off x="572576" y="1132571"/>
+            <a:ext cx="3927707" cy="2618471"/>
           </a:xfrm>
           <a:prstGeom prst="rect">
             <a:avLst/>
@@ -9562,10 +11429,10 @@
       </p:pic>
       <p:pic>
         <p:nvPicPr>
-          <p:cNvPr id="25" name="Picture 24" descr="A graph with colored dots&#10;&#10;AI-generated content may be incorrect.">
+          <p:cNvPr id="8" name="Picture 7" descr="A graph with colored dots&#10;&#10;AI-generated content may be incorrect.">
             <a:extLst>
               <a:ext uri="{FF2B5EF4-FFF2-40B4-BE49-F238E27FC236}">
-                <a16:creationId xmlns:a16="http://schemas.microsoft.com/office/drawing/2014/main" id="{442DEC0C-4850-0B0E-C249-8A7017DBF549}"/>
+                <a16:creationId xmlns:a16="http://schemas.microsoft.com/office/drawing/2014/main" id="{B1BA25B5-4E20-6EAD-9B76-BAF422BEE732}"/>
               </a:ext>
             </a:extLst>
           </p:cNvPr>
@@ -9582,15 +11449,15 @@
               </a:ext>
             </a:extLst>
           </a:blip>
-          <a:srcRect l="6012" t="6694" r="8854" b="3055"/>
+          <a:srcRect l="5187" t="5218" r="8216" b="2807"/>
           <a:stretch>
             <a:fillRect/>
           </a:stretch>
         </p:blipFill>
         <p:spPr>
           <a:xfrm>
-            <a:off x="4628567" y="1019179"/>
-            <a:ext cx="4062995" cy="2584263"/>
+            <a:off x="4677089" y="1092527"/>
+            <a:ext cx="3594345" cy="2545051"/>
           </a:xfrm>
           <a:prstGeom prst="rect">
             <a:avLst/>
@@ -10915,6 +12782,61 @@
           </a:p>
         </p:txBody>
       </p:sp>
+      <p:sp>
+        <p:nvSpPr>
+          <p:cNvPr id="2" name="TextBox 1">
+            <a:extLst>
+              <a:ext uri="{FF2B5EF4-FFF2-40B4-BE49-F238E27FC236}">
+                <a16:creationId xmlns:a16="http://schemas.microsoft.com/office/drawing/2014/main" id="{AD11AAA0-5DDB-B68E-BCF0-1CE385F92136}"/>
+              </a:ext>
+            </a:extLst>
+          </p:cNvPr>
+          <p:cNvSpPr txBox="1"/>
+          <p:nvPr/>
+        </p:nvSpPr>
+        <p:spPr>
+          <a:xfrm>
+            <a:off x="997743" y="1521619"/>
+            <a:ext cx="7129463" cy="1538883"/>
+          </a:xfrm>
+          <a:prstGeom prst="rect">
+            <a:avLst/>
+          </a:prstGeom>
+          <a:noFill/>
+        </p:spPr>
+        <p:txBody>
+          <a:bodyPr wrap="square" rtlCol="0">
+            <a:spAutoFit/>
+          </a:bodyPr>
+          <a:lstStyle/>
+          <a:p>
+            <a:pPr algn="ctr"/>
+            <a:r>
+              <a:rPr lang="en-US" sz="2000" dirty="0"/>
+              <a:t>“</a:t>
+            </a:r>
+            <a:r>
+              <a:rPr lang="en-US" sz="2000" b="1" dirty="0"/>
+              <a:t>The only relevant test of the validity of a hypothesis is comparison of prediction with experience.”</a:t>
+            </a:r>
+          </a:p>
+          <a:p>
+            <a:pPr algn="ctr"/>
+            <a:endParaRPr lang="en-US" b="1" dirty="0"/>
+          </a:p>
+          <a:p>
+            <a:pPr algn="ctr"/>
+            <a:r>
+              <a:rPr lang="en-US" b="1" dirty="0"/>
+              <a:t>- Milton Friedman -</a:t>
+            </a:r>
+          </a:p>
+          <a:p>
+            <a:pPr algn="ctr"/>
+            <a:endParaRPr lang="en-US" b="1" dirty="0"/>
+          </a:p>
+        </p:txBody>
+      </p:sp>
     </p:spTree>
     <p:extLst>
       <p:ext uri="{BB962C8B-B14F-4D97-AF65-F5344CB8AC3E}">
@@ -11440,15 +13362,6 @@
               <a:rPr lang="de-DE" dirty="0"/>
               <a:t>COVID-19 Testhäufigkeit – ca. 6100 Einträge</a:t>
             </a:r>
-          </a:p>
-          <a:p>
-            <a:pPr marL="342900" indent="-342900">
-              <a:buClr>
-                <a:schemeClr val="accent2"/>
-              </a:buClr>
-              <a:buFont typeface="Arial" panose="020B0604020202020204" pitchFamily="34" charset="0"/>
-              <a:buChar char="•"/>
-            </a:pPr>
             <a:endParaRPr lang="de-DE" sz="2000" dirty="0"/>
           </a:p>
           <a:p>
@@ -14493,84 +16406,60 @@
             </a:r>
           </a:p>
           <a:p>
-            <a:pPr marL="342900" indent="-342900">
-              <a:buClr>
-                <a:schemeClr val="accent2"/>
-              </a:buClr>
-              <a:buFont typeface="Arial" panose="020B0604020202020204" pitchFamily="34" charset="0"/>
-              <a:buChar char="•"/>
-            </a:pPr>
-            <a:endParaRPr lang="en-US" sz="2000" b="1" dirty="0"/>
-          </a:p>
-          <a:p>
-            <a:pPr marL="342900" indent="-342900">
-              <a:buClr>
-                <a:schemeClr val="accent2"/>
-              </a:buClr>
-              <a:buFont typeface="Arial" panose="020B0604020202020204" pitchFamily="34" charset="0"/>
-              <a:buChar char="•"/>
-            </a:pPr>
-            <a:r>
-              <a:rPr lang="en-US" sz="2000" b="1" dirty="0"/>
-              <a:t>Uniqueness</a:t>
-            </a:r>
-          </a:p>
-          <a:p>
             <a:pPr marL="774900" lvl="1" indent="-342900">
               <a:buClr>
                 <a:schemeClr val="accent2"/>
               </a:buClr>
             </a:pPr>
             <a:r>
-              <a:rPr lang="en-US" sz="1800" dirty="0" err="1"/>
-              <a:t>Sortierung</a:t>
-            </a:r>
-            <a:r>
-              <a:rPr lang="en-US" sz="1800" dirty="0"/>
+              <a:rPr lang="en-US" dirty="0"/>
+              <a:t>7.63% </a:t>
+            </a:r>
+            <a:r>
+              <a:rPr lang="en-US" dirty="0" err="1"/>
+              <a:t>aller</a:t>
+            </a:r>
+            <a:r>
+              <a:rPr lang="en-US" dirty="0"/>
               <a:t> </a:t>
             </a:r>
             <a:r>
-              <a:rPr lang="en-US" sz="1800" dirty="0" err="1"/>
-              <a:t>nach</a:t>
-            </a:r>
-            <a:r>
-              <a:rPr lang="en-US" sz="1800" dirty="0"/>
-              <a:t> Land und Datum </a:t>
-            </a:r>
-            <a:r>
-              <a:rPr lang="en-US" sz="1800" dirty="0" err="1"/>
-              <a:t>stellt</a:t>
-            </a:r>
-            <a:r>
-              <a:rPr lang="en-US" sz="1800" dirty="0"/>
+              <a:rPr lang="en-US" dirty="0" err="1"/>
+              <a:t>Einträge</a:t>
+            </a:r>
+            <a:r>
+              <a:rPr lang="en-US" dirty="0"/>
+              <a:t> des Deaths/Cases </a:t>
+            </a:r>
+            <a:r>
+              <a:rPr lang="en-US" dirty="0" err="1"/>
+              <a:t>Datensatz</a:t>
+            </a:r>
+            <a:r>
+              <a:rPr lang="en-US" dirty="0"/>
               <a:t> </a:t>
             </a:r>
             <a:r>
-              <a:rPr lang="en-US" sz="1800" dirty="0" err="1"/>
-              <a:t>Einzigartigkeit</a:t>
-            </a:r>
-            <a:r>
-              <a:rPr lang="en-US" sz="1800" dirty="0"/>
+              <a:rPr lang="en-US" dirty="0" err="1"/>
+              <a:t>haben</a:t>
+            </a:r>
+            <a:r>
+              <a:rPr lang="en-US" dirty="0"/>
               <a:t> </a:t>
             </a:r>
             <a:r>
-              <a:rPr lang="en-US" sz="1800" dirty="0" err="1"/>
-              <a:t>sicher</a:t>
-            </a:r>
-            <a:endParaRPr lang="en-US" sz="2000" b="1" dirty="0"/>
-          </a:p>
-          <a:p>
-            <a:pPr marL="342900" indent="-342900">
-              <a:buClr>
-                <a:schemeClr val="accent2"/>
-              </a:buClr>
-              <a:buFont typeface="Arial" panose="020B0604020202020204" pitchFamily="34" charset="0"/>
-              <a:buChar char="•"/>
-            </a:pPr>
-            <a:r>
-              <a:rPr lang="en-US" sz="2000" b="1" dirty="0"/>
-              <a:t>Timeliness</a:t>
-            </a:r>
+              <a:rPr lang="en-US" dirty="0" err="1"/>
+              <a:t>NaN</a:t>
+            </a:r>
+            <a:r>
+              <a:rPr lang="en-US" dirty="0"/>
+              <a:t> </a:t>
+            </a:r>
+            <a:r>
+              <a:rPr lang="en-US" dirty="0" err="1"/>
+              <a:t>Werte</a:t>
+            </a:r>
+            <a:endParaRPr lang="en-US" dirty="0"/>
           </a:p>
           <a:p>
             <a:pPr marL="774900" lvl="1" indent="-342900">
@@ -14579,14 +16468,30 @@
               </a:buClr>
             </a:pPr>
             <a:r>
-              <a:rPr lang="en-US" sz="1800" dirty="0"/>
-              <a:t>Pro Land </a:t>
-            </a:r>
-            <a:r>
-              <a:rPr lang="en-US" sz="1800" dirty="0" err="1"/>
-              <a:t>repräsentativ</a:t>
-            </a:r>
-            <a:endParaRPr lang="en-US" sz="1800" dirty="0"/>
+              <a:rPr lang="en-US" dirty="0"/>
+              <a:t>Bei Testing </a:t>
+            </a:r>
+            <a:r>
+              <a:rPr lang="en-US" dirty="0" err="1"/>
+              <a:t>Datensatz</a:t>
+            </a:r>
+            <a:r>
+              <a:rPr lang="en-US" dirty="0"/>
+              <a:t>: 18.86%</a:t>
+            </a:r>
+          </a:p>
+          <a:p>
+            <a:pPr marL="342900" indent="-342900">
+              <a:buClr>
+                <a:schemeClr val="accent2"/>
+              </a:buClr>
+              <a:buFont typeface="Arial" panose="020B0604020202020204" pitchFamily="34" charset="0"/>
+              <a:buChar char="•"/>
+            </a:pPr>
+            <a:r>
+              <a:rPr lang="en-US" sz="2000" b="1" dirty="0"/>
+              <a:t>Uniqueness</a:t>
+            </a:r>
           </a:p>
           <a:p>
             <a:pPr marL="774900" lvl="1" indent="-342900">
@@ -14595,58 +16500,131 @@
               </a:buClr>
             </a:pPr>
             <a:r>
-              <a:rPr lang="en-US" sz="1800" dirty="0" err="1"/>
+              <a:rPr lang="en-US" dirty="0" err="1"/>
+              <a:t>Sortierung</a:t>
+            </a:r>
+            <a:r>
+              <a:rPr lang="en-US" dirty="0"/>
+              <a:t> </a:t>
+            </a:r>
+            <a:r>
+              <a:rPr lang="en-US" dirty="0" err="1"/>
+              <a:t>nach</a:t>
+            </a:r>
+            <a:r>
+              <a:rPr lang="en-US" dirty="0"/>
+              <a:t> Land und Datum </a:t>
+            </a:r>
+            <a:r>
+              <a:rPr lang="en-US" dirty="0" err="1"/>
+              <a:t>stellt</a:t>
+            </a:r>
+            <a:r>
+              <a:rPr lang="en-US" dirty="0"/>
+              <a:t> </a:t>
+            </a:r>
+            <a:r>
+              <a:rPr lang="en-US" dirty="0" err="1"/>
+              <a:t>Einzigartigkeit</a:t>
+            </a:r>
+            <a:r>
+              <a:rPr lang="en-US" dirty="0"/>
+              <a:t> </a:t>
+            </a:r>
+            <a:r>
+              <a:rPr lang="en-US" dirty="0" err="1"/>
+              <a:t>sicher</a:t>
+            </a:r>
+            <a:endParaRPr lang="en-US" b="1" dirty="0"/>
+          </a:p>
+          <a:p>
+            <a:pPr marL="342900" indent="-342900">
+              <a:buClr>
+                <a:schemeClr val="accent2"/>
+              </a:buClr>
+              <a:buFont typeface="Arial" panose="020B0604020202020204" pitchFamily="34" charset="0"/>
+              <a:buChar char="•"/>
+            </a:pPr>
+            <a:r>
+              <a:rPr lang="en-US" sz="2000" b="1" dirty="0"/>
+              <a:t>Timeliness</a:t>
+            </a:r>
+          </a:p>
+          <a:p>
+            <a:pPr marL="774900" lvl="1" indent="-342900">
+              <a:buClr>
+                <a:schemeClr val="accent2"/>
+              </a:buClr>
+            </a:pPr>
+            <a:r>
+              <a:rPr lang="en-US" dirty="0"/>
+              <a:t>Pro Land </a:t>
+            </a:r>
+            <a:r>
+              <a:rPr lang="en-US" dirty="0" err="1"/>
+              <a:t>repräsentativ</a:t>
+            </a:r>
+            <a:endParaRPr lang="en-US" dirty="0"/>
+          </a:p>
+          <a:p>
+            <a:pPr marL="774900" lvl="1" indent="-342900">
+              <a:buClr>
+                <a:schemeClr val="accent2"/>
+              </a:buClr>
+            </a:pPr>
+            <a:r>
+              <a:rPr lang="en-US" dirty="0" err="1"/>
               <a:t>Während</a:t>
             </a:r>
             <a:r>
-              <a:rPr lang="en-US" sz="1800" dirty="0"/>
+              <a:rPr lang="en-US" dirty="0"/>
               <a:t> </a:t>
             </a:r>
             <a:r>
-              <a:rPr lang="en-US" sz="1800" dirty="0" err="1"/>
+              <a:rPr lang="en-US" dirty="0" err="1"/>
               <a:t>Pandemie</a:t>
             </a:r>
             <a:r>
-              <a:rPr lang="en-US" sz="1800" dirty="0"/>
+              <a:rPr lang="en-US" dirty="0"/>
               <a:t> </a:t>
             </a:r>
             <a:r>
-              <a:rPr lang="en-US" sz="1800" dirty="0" err="1"/>
+              <a:rPr lang="en-US" dirty="0" err="1"/>
               <a:t>schwierig</a:t>
             </a:r>
             <a:r>
-              <a:rPr lang="en-US" sz="1800" dirty="0"/>
+              <a:rPr lang="en-US" dirty="0"/>
               <a:t> </a:t>
             </a:r>
             <a:r>
-              <a:rPr lang="en-US" sz="1800" dirty="0" err="1"/>
+              <a:rPr lang="en-US" dirty="0" err="1"/>
               <a:t>eine</a:t>
             </a:r>
             <a:r>
-              <a:rPr lang="en-US" sz="1800" dirty="0"/>
+              <a:rPr lang="en-US" dirty="0"/>
               <a:t> 100% </a:t>
             </a:r>
             <a:r>
-              <a:rPr lang="en-US" sz="1800" dirty="0" err="1"/>
+              <a:rPr lang="en-US" dirty="0" err="1"/>
               <a:t>Garantie</a:t>
             </a:r>
             <a:r>
-              <a:rPr lang="en-US" sz="1800" dirty="0"/>
+              <a:rPr lang="en-US" dirty="0"/>
               <a:t> </a:t>
             </a:r>
             <a:r>
-              <a:rPr lang="en-US" sz="1800" dirty="0" err="1"/>
+              <a:rPr lang="en-US" dirty="0" err="1"/>
               <a:t>zu</a:t>
             </a:r>
             <a:r>
-              <a:rPr lang="en-US" sz="1800" dirty="0"/>
+              <a:rPr lang="en-US" dirty="0"/>
               <a:t> </a:t>
             </a:r>
             <a:r>
-              <a:rPr lang="en-US" sz="1800" dirty="0" err="1"/>
+              <a:rPr lang="en-US" dirty="0" err="1"/>
               <a:t>geben</a:t>
             </a:r>
-            <a:endParaRPr lang="en-US" sz="1800" dirty="0"/>
+            <a:endParaRPr lang="en-US" dirty="0"/>
           </a:p>
         </p:txBody>
       </p:sp>

</xml_diff>